<commit_message>
Arquivo novo do código resumido
</commit_message>
<xml_diff>
--- a/iag6slides-excap2-20212.pptx
+++ b/iag6slides-excap2-20212.pptx
@@ -1473,13 +1473,37 @@
               <a:rPr b="0" lang="pt-BR" sz="3200" spc="-1" strike="noStrike">
                 <a:latin typeface="Arial"/>
               </a:rPr>
-              <a:t>Clique para editar o formato do texto da </a:t>
-            </a:r>
-            <a:r>
-              <a:rPr b="0" lang="pt-BR" sz="3200" spc="-1" strike="noStrike">
-                <a:latin typeface="Arial"/>
-              </a:rPr>
-              <a:t>estrutura de tópicos</a:t>
+              <a:t>Clique para </a:t>
+            </a:r>
+            <a:r>
+              <a:rPr b="0" lang="pt-BR" sz="3200" spc="-1" strike="noStrike">
+                <a:latin typeface="Arial"/>
+              </a:rPr>
+              <a:t>editar o </a:t>
+            </a:r>
+            <a:r>
+              <a:rPr b="0" lang="pt-BR" sz="3200" spc="-1" strike="noStrike">
+                <a:latin typeface="Arial"/>
+              </a:rPr>
+              <a:t>formato do </a:t>
+            </a:r>
+            <a:r>
+              <a:rPr b="0" lang="pt-BR" sz="3200" spc="-1" strike="noStrike">
+                <a:latin typeface="Arial"/>
+              </a:rPr>
+              <a:t>texto da </a:t>
+            </a:r>
+            <a:r>
+              <a:rPr b="0" lang="pt-BR" sz="3200" spc="-1" strike="noStrike">
+                <a:latin typeface="Arial"/>
+              </a:rPr>
+              <a:t>estrutura de </a:t>
+            </a:r>
+            <a:r>
+              <a:rPr b="0" lang="pt-BR" sz="3200" spc="-1" strike="noStrike">
+                <a:latin typeface="Arial"/>
+              </a:rPr>
+              <a:t>tópicos</a:t>
             </a:r>
             <a:endParaRPr b="0" lang="pt-BR" sz="3200" spc="-1" strike="noStrike">
               <a:latin typeface="Arial"/>
@@ -1501,7 +1525,19 @@
               <a:rPr b="0" lang="pt-BR" sz="2800" spc="-1" strike="noStrike">
                 <a:latin typeface="Arial"/>
               </a:rPr>
-              <a:t>2.º nível da estrutura de tópicos</a:t>
+              <a:t>2.º nível da </a:t>
+            </a:r>
+            <a:r>
+              <a:rPr b="0" lang="pt-BR" sz="2800" spc="-1" strike="noStrike">
+                <a:latin typeface="Arial"/>
+              </a:rPr>
+              <a:t>estrutura de </a:t>
+            </a:r>
+            <a:r>
+              <a:rPr b="0" lang="pt-BR" sz="2800" spc="-1" strike="noStrike">
+                <a:latin typeface="Arial"/>
+              </a:rPr>
+              <a:t>tópicos</a:t>
             </a:r>
             <a:endParaRPr b="0" lang="pt-BR" sz="2800" spc="-1" strike="noStrike">
               <a:latin typeface="Arial"/>
@@ -1523,7 +1559,19 @@
               <a:rPr b="0" lang="pt-BR" sz="2400" spc="-1" strike="noStrike">
                 <a:latin typeface="Arial"/>
               </a:rPr>
-              <a:t>3.º nível da estrutura de tópicos</a:t>
+              <a:t>3.º nível da </a:t>
+            </a:r>
+            <a:r>
+              <a:rPr b="0" lang="pt-BR" sz="2400" spc="-1" strike="noStrike">
+                <a:latin typeface="Arial"/>
+              </a:rPr>
+              <a:t>estrutura </a:t>
+            </a:r>
+            <a:r>
+              <a:rPr b="0" lang="pt-BR" sz="2400" spc="-1" strike="noStrike">
+                <a:latin typeface="Arial"/>
+              </a:rPr>
+              <a:t>de tópicos</a:t>
             </a:r>
             <a:endParaRPr b="0" lang="pt-BR" sz="2400" spc="-1" strike="noStrike">
               <a:latin typeface="Arial"/>
@@ -1545,7 +1593,31 @@
               <a:rPr b="0" lang="pt-BR" sz="2000" spc="-1" strike="noStrike">
                 <a:latin typeface="Arial"/>
               </a:rPr>
-              <a:t>4.º nível da estrutura de tópicos</a:t>
+              <a:t>4.º nível </a:t>
+            </a:r>
+            <a:r>
+              <a:rPr b="0" lang="pt-BR" sz="2000" spc="-1" strike="noStrike">
+                <a:latin typeface="Arial"/>
+              </a:rPr>
+              <a:t>da </a:t>
+            </a:r>
+            <a:r>
+              <a:rPr b="0" lang="pt-BR" sz="2000" spc="-1" strike="noStrike">
+                <a:latin typeface="Arial"/>
+              </a:rPr>
+              <a:t>estrutura </a:t>
+            </a:r>
+            <a:r>
+              <a:rPr b="0" lang="pt-BR" sz="2000" spc="-1" strike="noStrike">
+                <a:latin typeface="Arial"/>
+              </a:rPr>
+              <a:t>de </a:t>
+            </a:r>
+            <a:r>
+              <a:rPr b="0" lang="pt-BR" sz="2000" spc="-1" strike="noStrike">
+                <a:latin typeface="Arial"/>
+              </a:rPr>
+              <a:t>tópicos</a:t>
             </a:r>
             <a:endParaRPr b="0" lang="pt-BR" sz="2000" spc="-1" strike="noStrike">
               <a:latin typeface="Arial"/>
@@ -1567,7 +1639,49 @@
               <a:rPr b="0" lang="pt-BR" sz="2000" spc="-1" strike="noStrike">
                 <a:latin typeface="Arial"/>
               </a:rPr>
-              <a:t>5.º nível da estrutura de tópicos</a:t>
+              <a:t>5.º </a:t>
+            </a:r>
+            <a:r>
+              <a:rPr b="0" lang="pt-BR" sz="2000" spc="-1" strike="noStrike">
+                <a:latin typeface="Arial"/>
+              </a:rPr>
+              <a:t>nível </a:t>
+            </a:r>
+            <a:r>
+              <a:rPr b="0" lang="pt-BR" sz="2000" spc="-1" strike="noStrike">
+                <a:latin typeface="Arial"/>
+              </a:rPr>
+              <a:t>da </a:t>
+            </a:r>
+            <a:r>
+              <a:rPr b="0" lang="pt-BR" sz="2000" spc="-1" strike="noStrike">
+                <a:latin typeface="Arial"/>
+              </a:rPr>
+              <a:t>estrut</a:t>
+            </a:r>
+            <a:r>
+              <a:rPr b="0" lang="pt-BR" sz="2000" spc="-1" strike="noStrike">
+                <a:latin typeface="Arial"/>
+              </a:rPr>
+              <a:t>ura </a:t>
+            </a:r>
+            <a:r>
+              <a:rPr b="0" lang="pt-BR" sz="2000" spc="-1" strike="noStrike">
+                <a:latin typeface="Arial"/>
+              </a:rPr>
+              <a:t>de </a:t>
+            </a:r>
+            <a:r>
+              <a:rPr b="0" lang="pt-BR" sz="2000" spc="-1" strike="noStrike">
+                <a:latin typeface="Arial"/>
+              </a:rPr>
+              <a:t>tópico</a:t>
+            </a:r>
+            <a:r>
+              <a:rPr b="0" lang="pt-BR" sz="2000" spc="-1" strike="noStrike">
+                <a:latin typeface="Arial"/>
+              </a:rPr>
+              <a:t>s</a:t>
             </a:r>
             <a:endParaRPr b="0" lang="pt-BR" sz="2000" spc="-1" strike="noStrike">
               <a:latin typeface="Arial"/>
@@ -1589,7 +1703,115 @@
               <a:rPr b="0" lang="pt-BR" sz="2000" spc="-1" strike="noStrike">
                 <a:latin typeface="Arial"/>
               </a:rPr>
-              <a:t>6.º nível da estrutura de tópicos</a:t>
+              <a:t>6.</a:t>
+            </a:r>
+            <a:r>
+              <a:rPr b="0" lang="pt-BR" sz="2000" spc="-1" strike="noStrike">
+                <a:latin typeface="Arial"/>
+              </a:rPr>
+              <a:t>º </a:t>
+            </a:r>
+            <a:r>
+              <a:rPr b="0" lang="pt-BR" sz="2000" spc="-1" strike="noStrike">
+                <a:latin typeface="Arial"/>
+              </a:rPr>
+              <a:t>ní</a:t>
+            </a:r>
+            <a:r>
+              <a:rPr b="0" lang="pt-BR" sz="2000" spc="-1" strike="noStrike">
+                <a:latin typeface="Arial"/>
+              </a:rPr>
+              <a:t>v</a:t>
+            </a:r>
+            <a:r>
+              <a:rPr b="0" lang="pt-BR" sz="2000" spc="-1" strike="noStrike">
+                <a:latin typeface="Arial"/>
+              </a:rPr>
+              <a:t>el </a:t>
+            </a:r>
+            <a:r>
+              <a:rPr b="0" lang="pt-BR" sz="2000" spc="-1" strike="noStrike">
+                <a:latin typeface="Arial"/>
+              </a:rPr>
+              <a:t>d</a:t>
+            </a:r>
+            <a:r>
+              <a:rPr b="0" lang="pt-BR" sz="2000" spc="-1" strike="noStrike">
+                <a:latin typeface="Arial"/>
+              </a:rPr>
+              <a:t>a </a:t>
+            </a:r>
+            <a:r>
+              <a:rPr b="0" lang="pt-BR" sz="2000" spc="-1" strike="noStrike">
+                <a:latin typeface="Arial"/>
+              </a:rPr>
+              <a:t>e</a:t>
+            </a:r>
+            <a:r>
+              <a:rPr b="0" lang="pt-BR" sz="2000" spc="-1" strike="noStrike">
+                <a:latin typeface="Arial"/>
+              </a:rPr>
+              <a:t>st</a:t>
+            </a:r>
+            <a:r>
+              <a:rPr b="0" lang="pt-BR" sz="2000" spc="-1" strike="noStrike">
+                <a:latin typeface="Arial"/>
+              </a:rPr>
+              <a:t>ru</a:t>
+            </a:r>
+            <a:r>
+              <a:rPr b="0" lang="pt-BR" sz="2000" spc="-1" strike="noStrike">
+                <a:latin typeface="Arial"/>
+              </a:rPr>
+              <a:t>tu</a:t>
+            </a:r>
+            <a:r>
+              <a:rPr b="0" lang="pt-BR" sz="2000" spc="-1" strike="noStrike">
+                <a:latin typeface="Arial"/>
+              </a:rPr>
+              <a:t>ra </a:t>
+            </a:r>
+            <a:r>
+              <a:rPr b="0" lang="pt-BR" sz="2000" spc="-1" strike="noStrike">
+                <a:latin typeface="Arial"/>
+              </a:rPr>
+              <a:t>d</a:t>
+            </a:r>
+            <a:r>
+              <a:rPr b="0" lang="pt-BR" sz="2000" spc="-1" strike="noStrike">
+                <a:latin typeface="Arial"/>
+              </a:rPr>
+              <a:t>e </a:t>
+            </a:r>
+            <a:r>
+              <a:rPr b="0" lang="pt-BR" sz="2000" spc="-1" strike="noStrike">
+                <a:latin typeface="Arial"/>
+              </a:rPr>
+              <a:t>tó</a:t>
+            </a:r>
+            <a:r>
+              <a:rPr b="0" lang="pt-BR" sz="2000" spc="-1" strike="noStrike">
+                <a:latin typeface="Arial"/>
+              </a:rPr>
+              <a:t>pi</a:t>
+            </a:r>
+            <a:r>
+              <a:rPr b="0" lang="pt-BR" sz="2000" spc="-1" strike="noStrike">
+                <a:latin typeface="Arial"/>
+              </a:rPr>
+              <a:t>c</a:t>
+            </a:r>
+            <a:r>
+              <a:rPr b="0" lang="pt-BR" sz="2000" spc="-1" strike="noStrike">
+                <a:latin typeface="Arial"/>
+              </a:rPr>
+              <a:t>o</a:t>
+            </a:r>
+            <a:r>
+              <a:rPr b="0" lang="pt-BR" sz="2000" spc="-1" strike="noStrike">
+                <a:latin typeface="Arial"/>
+              </a:rPr>
+              <a:t>s</a:t>
             </a:r>
             <a:endParaRPr b="0" lang="pt-BR" sz="2000" spc="-1" strike="noStrike">
               <a:latin typeface="Arial"/>
@@ -1611,7 +1833,199 @@
               <a:rPr b="0" lang="pt-BR" sz="2000" spc="-1" strike="noStrike">
                 <a:latin typeface="Arial"/>
               </a:rPr>
-              <a:t>7.º nível da estrutura de tópicos</a:t>
+              <a:t>7</a:t>
+            </a:r>
+            <a:r>
+              <a:rPr b="0" lang="pt-BR" sz="2000" spc="-1" strike="noStrike">
+                <a:latin typeface="Arial"/>
+              </a:rPr>
+              <a:t>.</a:t>
+            </a:r>
+            <a:r>
+              <a:rPr b="0" lang="pt-BR" sz="2000" spc="-1" strike="noStrike">
+                <a:latin typeface="Arial"/>
+              </a:rPr>
+              <a:t>º</a:t>
+            </a:r>
+            <a:r>
+              <a:rPr b="0" lang="pt-BR" sz="2000" spc="-1" strike="noStrike">
+                <a:latin typeface="Arial"/>
+              </a:rPr>
+              <a:t> </a:t>
+            </a:r>
+            <a:r>
+              <a:rPr b="0" lang="pt-BR" sz="2000" spc="-1" strike="noStrike">
+                <a:latin typeface="Arial"/>
+              </a:rPr>
+              <a:t>n</a:t>
+            </a:r>
+            <a:r>
+              <a:rPr b="0" lang="pt-BR" sz="2000" spc="-1" strike="noStrike">
+                <a:latin typeface="Arial"/>
+              </a:rPr>
+              <a:t>í</a:t>
+            </a:r>
+            <a:r>
+              <a:rPr b="0" lang="pt-BR" sz="2000" spc="-1" strike="noStrike">
+                <a:latin typeface="Arial"/>
+              </a:rPr>
+              <a:t>v</a:t>
+            </a:r>
+            <a:r>
+              <a:rPr b="0" lang="pt-BR" sz="2000" spc="-1" strike="noStrike">
+                <a:latin typeface="Arial"/>
+              </a:rPr>
+              <a:t>e</a:t>
+            </a:r>
+            <a:r>
+              <a:rPr b="0" lang="pt-BR" sz="2000" spc="-1" strike="noStrike">
+                <a:latin typeface="Arial"/>
+              </a:rPr>
+              <a:t>l</a:t>
+            </a:r>
+            <a:r>
+              <a:rPr b="0" lang="pt-BR" sz="2000" spc="-1" strike="noStrike">
+                <a:latin typeface="Arial"/>
+              </a:rPr>
+              <a:t> </a:t>
+            </a:r>
+            <a:r>
+              <a:rPr b="0" lang="pt-BR" sz="2000" spc="-1" strike="noStrike">
+                <a:latin typeface="Arial"/>
+              </a:rPr>
+              <a:t>d</a:t>
+            </a:r>
+            <a:r>
+              <a:rPr b="0" lang="pt-BR" sz="2000" spc="-1" strike="noStrike">
+                <a:latin typeface="Arial"/>
+              </a:rPr>
+              <a:t>a</a:t>
+            </a:r>
+            <a:r>
+              <a:rPr b="0" lang="pt-BR" sz="2000" spc="-1" strike="noStrike">
+                <a:latin typeface="Arial"/>
+              </a:rPr>
+              <a:t> </a:t>
+            </a:r>
+            <a:r>
+              <a:rPr b="0" lang="pt-BR" sz="2000" spc="-1" strike="noStrike">
+                <a:latin typeface="Arial"/>
+              </a:rPr>
+              <a:t>e</a:t>
+            </a:r>
+            <a:r>
+              <a:rPr b="0" lang="pt-BR" sz="2000" spc="-1" strike="noStrike">
+                <a:latin typeface="Arial"/>
+              </a:rPr>
+              <a:t>s</a:t>
+            </a:r>
+            <a:r>
+              <a:rPr b="0" lang="pt-BR" sz="2000" spc="-1" strike="noStrike">
+                <a:latin typeface="Arial"/>
+              </a:rPr>
+              <a:t>t</a:t>
+            </a:r>
+            <a:r>
+              <a:rPr b="0" lang="pt-BR" sz="2000" spc="-1" strike="noStrike">
+                <a:latin typeface="Arial"/>
+              </a:rPr>
+              <a:t>r</a:t>
+            </a:r>
+            <a:r>
+              <a:rPr b="0" lang="pt-BR" sz="2000" spc="-1" strike="noStrike">
+                <a:latin typeface="Arial"/>
+              </a:rPr>
+              <a:t>u</a:t>
+            </a:r>
+            <a:r>
+              <a:rPr b="0" lang="pt-BR" sz="2000" spc="-1" strike="noStrike">
+                <a:latin typeface="Arial"/>
+              </a:rPr>
+              <a:t>t</a:t>
+            </a:r>
+            <a:r>
+              <a:rPr b="0" lang="pt-BR" sz="2000" spc="-1" strike="noStrike">
+                <a:latin typeface="Arial"/>
+              </a:rPr>
+              <a:t>u</a:t>
+            </a:r>
+            <a:r>
+              <a:rPr b="0" lang="pt-BR" sz="2000" spc="-1" strike="noStrike">
+                <a:latin typeface="Arial"/>
+              </a:rPr>
+              <a:t>r</a:t>
+            </a:r>
+            <a:r>
+              <a:rPr b="0" lang="pt-BR" sz="2000" spc="-1" strike="noStrike">
+                <a:latin typeface="Arial"/>
+              </a:rPr>
+              <a:t>a</a:t>
+            </a:r>
+            <a:r>
+              <a:rPr b="0" lang="pt-BR" sz="2000" spc="-1" strike="noStrike">
+                <a:latin typeface="Arial"/>
+              </a:rPr>
+              <a:t> </a:t>
+            </a:r>
+            <a:r>
+              <a:rPr b="0" lang="pt-BR" sz="2000" spc="-1" strike="noStrike">
+                <a:latin typeface="Arial"/>
+              </a:rPr>
+              <a:t>d</a:t>
+            </a:r>
+            <a:r>
+              <a:rPr b="0" lang="pt-BR" sz="2000" spc="-1" strike="noStrike">
+                <a:latin typeface="Arial"/>
+              </a:rPr>
+              <a:t>e</a:t>
+            </a:r>
+            <a:r>
+              <a:rPr b="0" lang="pt-BR" sz="2000" spc="-1" strike="noStrike">
+                <a:latin typeface="Arial"/>
+              </a:rPr>
+              <a:t> </a:t>
+            </a:r>
+            <a:r>
+              <a:rPr b="0" lang="pt-BR" sz="2000" spc="-1" strike="noStrike">
+                <a:latin typeface="Arial"/>
+              </a:rPr>
+              <a:t>t</a:t>
+            </a:r>
+            <a:r>
+              <a:rPr b="0" lang="pt-BR" sz="2000" spc="-1" strike="noStrike">
+                <a:latin typeface="Arial"/>
+              </a:rPr>
+              <a:t>ó</a:t>
+            </a:r>
+            <a:r>
+              <a:rPr b="0" lang="pt-BR" sz="2000" spc="-1" strike="noStrike">
+                <a:latin typeface="Arial"/>
+              </a:rPr>
+              <a:t>p</a:t>
+            </a:r>
+            <a:r>
+              <a:rPr b="0" lang="pt-BR" sz="2000" spc="-1" strike="noStrike">
+                <a:latin typeface="Arial"/>
+              </a:rPr>
+              <a:t>i</a:t>
+            </a:r>
+            <a:r>
+              <a:rPr b="0" lang="pt-BR" sz="2000" spc="-1" strike="noStrike">
+                <a:latin typeface="Arial"/>
+              </a:rPr>
+              <a:t>c</a:t>
+            </a:r>
+            <a:r>
+              <a:rPr b="0" lang="pt-BR" sz="2000" spc="-1" strike="noStrike">
+                <a:latin typeface="Arial"/>
+              </a:rPr>
+              <a:t>o</a:t>
+            </a:r>
+            <a:r>
+              <a:rPr b="0" lang="pt-BR" sz="2000" spc="-1" strike="noStrike">
+                <a:latin typeface="Arial"/>
+              </a:rPr>
+              <a:t>s</a:t>
             </a:r>
             <a:endParaRPr b="0" lang="pt-BR" sz="2000" spc="-1" strike="noStrike">
               <a:latin typeface="Arial"/>
@@ -1717,7 +2131,7 @@
           </a:bodyPr>
           <a:p>
             <a:pPr algn="r"/>
-            <a:fld id="{0320F57F-8CF7-452C-85D1-608DCE7F781D}" type="slidenum">
+            <a:fld id="{9AB2E1A1-3FD2-4509-86AB-FFC84C0BC7F0}" type="slidenum">
               <a:rPr b="0" lang="pt-BR" sz="1400" spc="-1" strike="noStrike">
                 <a:latin typeface="Times New Roman"/>
               </a:rPr>
@@ -1961,7 +2375,13 @@
               <a:rPr b="0" lang="pt-BR" sz="3200" spc="-1" strike="noStrike">
                 <a:latin typeface="Arial"/>
               </a:rPr>
-              <a:t>Desvio Padrão</a:t>
+              <a:t>Desvio </a:t>
+            </a:r>
+            <a:r>
+              <a:rPr b="0" lang="pt-BR" sz="3200" spc="-1" strike="noStrike">
+                <a:latin typeface="Arial"/>
+              </a:rPr>
+              <a:t>Padrão</a:t>
             </a:r>
             <a:endParaRPr b="0" lang="pt-BR" sz="3200" spc="-1" strike="noStrike">
               <a:latin typeface="Arial"/>
@@ -1983,13 +2403,13 @@
               <a:rPr b="0" lang="pt-BR" sz="3200" spc="-1" strike="noStrike">
                 <a:latin typeface="Arial"/>
               </a:rPr>
-              <a:t>Valor Mínimo e </a:t>
-            </a:r>
-            <a:r>
-              <a:rPr b="0" lang="pt-BR" sz="3200" spc="-1" strike="noStrike">
-                <a:latin typeface="Arial"/>
-              </a:rPr>
-              <a:t>Máximo</a:t>
+              <a:t>Valor Mínimo </a:t>
+            </a:r>
+            <a:r>
+              <a:rPr b="0" lang="pt-BR" sz="3200" spc="-1" strike="noStrike">
+                <a:latin typeface="Arial"/>
+              </a:rPr>
+              <a:t>e Máximo</a:t>
             </a:r>
             <a:endParaRPr b="0" lang="pt-BR" sz="3200" spc="-1" strike="noStrike">
               <a:latin typeface="Arial"/>
@@ -2011,13 +2431,25 @@
               <a:rPr b="0" lang="pt-BR" sz="3200" spc="-1" strike="noStrike">
                 <a:latin typeface="Arial"/>
               </a:rPr>
-              <a:t>Quartil – Primeiro, </a:t>
-            </a:r>
-            <a:r>
-              <a:rPr b="0" lang="pt-BR" sz="3200" spc="-1" strike="noStrike">
-                <a:latin typeface="Arial"/>
-              </a:rPr>
-              <a:t>Segundo(Mediana) e </a:t>
+              <a:t>Quartil – </a:t>
+            </a:r>
+            <a:r>
+              <a:rPr b="0" lang="pt-BR" sz="3200" spc="-1" strike="noStrike">
+                <a:latin typeface="Arial"/>
+              </a:rPr>
+              <a:t>Primeiro, </a:t>
+            </a:r>
+            <a:r>
+              <a:rPr b="0" lang="pt-BR" sz="3200" spc="-1" strike="noStrike">
+                <a:latin typeface="Arial"/>
+              </a:rPr>
+              <a:t>Segundo(Me</a:t>
+            </a:r>
+            <a:r>
+              <a:rPr b="0" lang="pt-BR" sz="3200" spc="-1" strike="noStrike">
+                <a:latin typeface="Arial"/>
+              </a:rPr>
+              <a:t>diana) e </a:t>
             </a:r>
             <a:r>
               <a:rPr b="0" lang="pt-BR" sz="3200" spc="-1" strike="noStrike">

</xml_diff>